<commit_message>
Started progress on final Clemens comments
</commit_message>
<xml_diff>
--- a/pockels contrast figure/pockels contrast figure.pptx
+++ b/pockels contrast figure/pockels contrast figure.pptx
@@ -6,6 +6,7 @@
   </p:sldMasterIdLst>
   <p:sldIdLst>
     <p:sldId id="256" r:id="rId2"/>
+    <p:sldId id="257" r:id="rId3"/>
   </p:sldIdLst>
   <p:sldSz cx="9601200" cy="5400675"/>
   <p:notesSz cx="6858000" cy="9144000"/>
@@ -104,6 +105,11 @@
       </a:defRPr>
     </a:lvl9pPr>
   </p:defaultTextStyle>
+  <p:extLst>
+    <p:ext uri="{EFAFB233-063F-42B5-8137-9DF3F51BA10A}">
+      <p15:sldGuideLst xmlns:p15="http://schemas.microsoft.com/office/powerpoint/2012/main"/>
+    </p:ext>
+  </p:extLst>
 </p:presentation>
 </file>
 
@@ -138,12 +144,28 @@
               </a:defRPr>
             </a:pPr>
             <a:r>
-              <a:rPr lang="en-GB">
+              <a:rPr lang="en-GB" dirty="0">
                 <a:solidFill>
                   <a:schemeClr val="tx1"/>
                 </a:solidFill>
               </a:rPr>
-              <a:t>Pattern contrast vs. Pockels cell voltage for 561nm channel</a:t>
+              <a:t>Pattern contrast vs. </a:t>
+            </a:r>
+            <a:r>
+              <a:rPr lang="en-GB" dirty="0" err="1">
+                <a:solidFill>
+                  <a:schemeClr val="tx1"/>
+                </a:solidFill>
+              </a:rPr>
+              <a:t>Pockels</a:t>
+            </a:r>
+            <a:r>
+              <a:rPr lang="en-GB" dirty="0">
+                <a:solidFill>
+                  <a:schemeClr val="tx1"/>
+                </a:solidFill>
+              </a:rPr>
+              <a:t> cell voltage for 561nm channel</a:t>
             </a:r>
           </a:p>
         </c:rich>
@@ -1364,7 +1386,1339 @@
 </c:chartSpace>
 </file>
 
+<file path=ppt/charts/chart2.xml><?xml version="1.0" encoding="utf-8"?>
+<c:chartSpace xmlns:c="http://schemas.openxmlformats.org/drawingml/2006/chart" xmlns:a="http://schemas.openxmlformats.org/drawingml/2006/main" xmlns:r="http://schemas.openxmlformats.org/officeDocument/2006/relationships" xmlns:c16r2="http://schemas.microsoft.com/office/drawing/2015/06/chart">
+  <c:date1904 val="0"/>
+  <c:lang val="en-US"/>
+  <c:roundedCorners val="0"/>
+  <mc:AlternateContent xmlns:mc="http://schemas.openxmlformats.org/markup-compatibility/2006">
+    <mc:Choice xmlns:c14="http://schemas.microsoft.com/office/drawing/2007/8/2/chart" Requires="c14">
+      <c14:style val="102"/>
+    </mc:Choice>
+    <mc:Fallback>
+      <c:style val="2"/>
+    </mc:Fallback>
+  </mc:AlternateContent>
+  <c:chart>
+    <c:title>
+      <c:tx>
+        <c:rich>
+          <a:bodyPr rot="0" spcFirstLastPara="1" vertOverflow="ellipsis" vert="horz" wrap="square" anchor="ctr" anchorCtr="1"/>
+          <a:lstStyle/>
+          <a:p>
+            <a:pPr>
+              <a:defRPr sz="1800" b="0" i="0" u="none" strike="noStrike" kern="1200" spc="0" baseline="0">
+                <a:solidFill>
+                  <a:schemeClr val="tx1"/>
+                </a:solidFill>
+                <a:latin typeface="+mn-lt"/>
+                <a:ea typeface="+mn-ea"/>
+                <a:cs typeface="+mn-cs"/>
+              </a:defRPr>
+            </a:pPr>
+            <a:r>
+              <a:rPr lang="en-GB" sz="1800" b="0" i="0" kern="1200" spc="0" baseline="0" dirty="0">
+                <a:solidFill>
+                  <a:schemeClr val="tx1"/>
+                </a:solidFill>
+                <a:effectLst/>
+              </a:rPr>
+              <a:t>Pattern contrast vs. </a:t>
+            </a:r>
+            <a:r>
+              <a:rPr lang="en-GB" sz="1800" b="0" i="0" kern="1200" spc="0" baseline="0" dirty="0" err="1">
+                <a:solidFill>
+                  <a:schemeClr val="tx1"/>
+                </a:solidFill>
+                <a:effectLst/>
+              </a:rPr>
+              <a:t>Pockels</a:t>
+            </a:r>
+            <a:r>
+              <a:rPr lang="en-GB" sz="1800" b="0" i="0" kern="1200" spc="0" baseline="0" dirty="0">
+                <a:solidFill>
+                  <a:schemeClr val="tx1"/>
+                </a:solidFill>
+                <a:effectLst/>
+              </a:rPr>
+              <a:t> cell voltage for 561nm channel</a:t>
+            </a:r>
+            <a:endParaRPr lang="en-GB" sz="1800" dirty="0">
+              <a:solidFill>
+                <a:schemeClr val="tx1"/>
+              </a:solidFill>
+              <a:effectLst/>
+            </a:endParaRPr>
+          </a:p>
+        </c:rich>
+      </c:tx>
+      <c:overlay val="0"/>
+      <c:spPr>
+        <a:noFill/>
+        <a:ln>
+          <a:noFill/>
+        </a:ln>
+        <a:effectLst/>
+      </c:spPr>
+      <c:txPr>
+        <a:bodyPr rot="0" spcFirstLastPara="1" vertOverflow="ellipsis" vert="horz" wrap="square" anchor="ctr" anchorCtr="1"/>
+        <a:lstStyle/>
+        <a:p>
+          <a:pPr>
+            <a:defRPr sz="1800" b="0" i="0" u="none" strike="noStrike" kern="1200" spc="0" baseline="0">
+              <a:solidFill>
+                <a:schemeClr val="tx1"/>
+              </a:solidFill>
+              <a:latin typeface="+mn-lt"/>
+              <a:ea typeface="+mn-ea"/>
+              <a:cs typeface="+mn-cs"/>
+            </a:defRPr>
+          </a:pPr>
+          <a:endParaRPr lang="en-US"/>
+        </a:p>
+      </c:txPr>
+    </c:title>
+    <c:autoTitleDeleted val="0"/>
+    <c:plotArea>
+      <c:layout>
+        <c:manualLayout>
+          <c:layoutTarget val="inner"/>
+          <c:xMode val="edge"/>
+          <c:yMode val="edge"/>
+          <c:x val="2.5419947506561676E-2"/>
+          <c:y val="9.4062316284538511E-2"/>
+          <c:w val="0.95098216889555476"/>
+          <c:h val="0.70510686164229475"/>
+        </c:manualLayout>
+      </c:layout>
+      <c:scatterChart>
+        <c:scatterStyle val="smoothMarker"/>
+        <c:varyColors val="0"/>
+        <c:ser>
+          <c:idx val="0"/>
+          <c:order val="0"/>
+          <c:tx>
+            <c:strRef>
+              <c:f>'561'!$E$1</c:f>
+              <c:strCache>
+                <c:ptCount val="1"/>
+                <c:pt idx="0">
+                  <c:v>0°</c:v>
+                </c:pt>
+              </c:strCache>
+            </c:strRef>
+          </c:tx>
+          <c:spPr>
+            <a:ln w="19050" cap="rnd">
+              <a:solidFill>
+                <a:schemeClr val="accent1"/>
+              </a:solidFill>
+              <a:round/>
+            </a:ln>
+            <a:effectLst/>
+          </c:spPr>
+          <c:marker>
+            <c:symbol val="circle"/>
+            <c:size val="5"/>
+            <c:spPr>
+              <a:solidFill>
+                <a:schemeClr val="accent1"/>
+              </a:solidFill>
+              <a:ln w="9525">
+                <a:solidFill>
+                  <a:schemeClr val="accent1"/>
+                </a:solidFill>
+              </a:ln>
+              <a:effectLst/>
+            </c:spPr>
+          </c:marker>
+          <c:xVal>
+            <c:numRef>
+              <c:f>'561'!$A$2:$A$41</c:f>
+              <c:numCache>
+                <c:formatCode>General</c:formatCode>
+                <c:ptCount val="40"/>
+                <c:pt idx="0">
+                  <c:v>-375</c:v>
+                </c:pt>
+                <c:pt idx="1">
+                  <c:v>-355.76923076923077</c:v>
+                </c:pt>
+                <c:pt idx="2">
+                  <c:v>-336.53846153846155</c:v>
+                </c:pt>
+                <c:pt idx="3">
+                  <c:v>-317.30769230769232</c:v>
+                </c:pt>
+                <c:pt idx="4">
+                  <c:v>-298.07692307692309</c:v>
+                </c:pt>
+                <c:pt idx="5">
+                  <c:v>-278.84615384615387</c:v>
+                </c:pt>
+                <c:pt idx="6">
+                  <c:v>-259.61538461538464</c:v>
+                </c:pt>
+                <c:pt idx="7">
+                  <c:v>-240.38461538461542</c:v>
+                </c:pt>
+                <c:pt idx="8">
+                  <c:v>-221.15384615384619</c:v>
+                </c:pt>
+                <c:pt idx="9">
+                  <c:v>-201.92307692307696</c:v>
+                </c:pt>
+                <c:pt idx="10">
+                  <c:v>-182.69230769230774</c:v>
+                </c:pt>
+                <c:pt idx="11">
+                  <c:v>-163.46153846153851</c:v>
+                </c:pt>
+                <c:pt idx="12">
+                  <c:v>-144.23076923076928</c:v>
+                </c:pt>
+                <c:pt idx="13">
+                  <c:v>-125.00000000000006</c:v>
+                </c:pt>
+                <c:pt idx="14">
+                  <c:v>-105.76923076923083</c:v>
+                </c:pt>
+                <c:pt idx="15">
+                  <c:v>-86.538461538461604</c:v>
+                </c:pt>
+                <c:pt idx="16">
+                  <c:v>-67.307692307692378</c:v>
+                </c:pt>
+                <c:pt idx="17">
+                  <c:v>-48.076923076923151</c:v>
+                </c:pt>
+                <c:pt idx="18">
+                  <c:v>-28.846153846153921</c:v>
+                </c:pt>
+                <c:pt idx="19">
+                  <c:v>-9.6153846153846914</c:v>
+                </c:pt>
+                <c:pt idx="20">
+                  <c:v>9.6153846153845386</c:v>
+                </c:pt>
+                <c:pt idx="21">
+                  <c:v>28.846153846153769</c:v>
+                </c:pt>
+                <c:pt idx="22">
+                  <c:v>48.076923076922995</c:v>
+                </c:pt>
+                <c:pt idx="23">
+                  <c:v>67.307692307692221</c:v>
+                </c:pt>
+                <c:pt idx="24">
+                  <c:v>86.538461538461448</c:v>
+                </c:pt>
+                <c:pt idx="25">
+                  <c:v>105.76923076923067</c:v>
+                </c:pt>
+                <c:pt idx="26">
+                  <c:v>124.9999999999999</c:v>
+                </c:pt>
+                <c:pt idx="27">
+                  <c:v>144.23076923076914</c:v>
+                </c:pt>
+                <c:pt idx="28">
+                  <c:v>163.46153846153837</c:v>
+                </c:pt>
+                <c:pt idx="29">
+                  <c:v>182.69230769230759</c:v>
+                </c:pt>
+                <c:pt idx="30">
+                  <c:v>201.92307692307682</c:v>
+                </c:pt>
+                <c:pt idx="31">
+                  <c:v>221.15384615384605</c:v>
+                </c:pt>
+                <c:pt idx="32">
+                  <c:v>240.38461538461527</c:v>
+                </c:pt>
+                <c:pt idx="33">
+                  <c:v>259.61538461538453</c:v>
+                </c:pt>
+                <c:pt idx="34">
+                  <c:v>278.84615384615375</c:v>
+                </c:pt>
+                <c:pt idx="35">
+                  <c:v>298.07692307692298</c:v>
+                </c:pt>
+                <c:pt idx="36">
+                  <c:v>317.30769230769221</c:v>
+                </c:pt>
+                <c:pt idx="37">
+                  <c:v>336.53846153846143</c:v>
+                </c:pt>
+                <c:pt idx="38">
+                  <c:v>355.76923076923066</c:v>
+                </c:pt>
+                <c:pt idx="39">
+                  <c:v>375</c:v>
+                </c:pt>
+              </c:numCache>
+            </c:numRef>
+          </c:xVal>
+          <c:yVal>
+            <c:numRef>
+              <c:f>'561'!$E$2:$E$41</c:f>
+              <c:numCache>
+                <c:formatCode>General</c:formatCode>
+                <c:ptCount val="40"/>
+                <c:pt idx="0">
+                  <c:v>0.91258262983321703</c:v>
+                </c:pt>
+                <c:pt idx="1">
+                  <c:v>0.80769073900578114</c:v>
+                </c:pt>
+                <c:pt idx="2">
+                  <c:v>0.63048920703564748</c:v>
+                </c:pt>
+                <c:pt idx="3">
+                  <c:v>0.4158883164629566</c:v>
+                </c:pt>
+                <c:pt idx="4">
+                  <c:v>0.22808355842871028</c:v>
+                </c:pt>
+                <c:pt idx="5">
+                  <c:v>8.5973431027343575E-2</c:v>
+                </c:pt>
+                <c:pt idx="6">
+                  <c:v>0.23206048257535911</c:v>
+                </c:pt>
+                <c:pt idx="7">
+                  <c:v>0.39055634796726851</c:v>
+                </c:pt>
+                <c:pt idx="8">
+                  <c:v>0.52842271330480506</c:v>
+                </c:pt>
+                <c:pt idx="9">
+                  <c:v>0.6157413165428206</c:v>
+                </c:pt>
+                <c:pt idx="10">
+                  <c:v>0.65298310634102541</c:v>
+                </c:pt>
+                <c:pt idx="11">
+                  <c:v>0.64664602038574126</c:v>
+                </c:pt>
+                <c:pt idx="12">
+                  <c:v>0.59426780795580691</c:v>
+                </c:pt>
+                <c:pt idx="13">
+                  <c:v>0.48625343883098382</c:v>
+                </c:pt>
+                <c:pt idx="14">
+                  <c:v>0.34642679753077765</c:v>
+                </c:pt>
+                <c:pt idx="15">
+                  <c:v>0.16202443834308</c:v>
+                </c:pt>
+                <c:pt idx="16">
+                  <c:v>0.10254592304329299</c:v>
+                </c:pt>
+                <c:pt idx="17">
+                  <c:v>0.28746011479191136</c:v>
+                </c:pt>
+                <c:pt idx="18">
+                  <c:v>0.49995049723556489</c:v>
+                </c:pt>
+                <c:pt idx="19">
+                  <c:v>0.69389737109048111</c:v>
+                </c:pt>
+                <c:pt idx="20">
+                  <c:v>0.85408522655429675</c:v>
+                </c:pt>
+                <c:pt idx="21">
+                  <c:v>0.96358682952310759</c:v>
+                </c:pt>
+                <c:pt idx="22">
+                  <c:v>0.99862173066419946</c:v>
+                </c:pt>
+                <c:pt idx="23">
+                  <c:v>0.96175340079337412</c:v>
+                </c:pt>
+                <c:pt idx="24">
+                  <c:v>0.85643236915991061</c:v>
+                </c:pt>
+                <c:pt idx="25">
+                  <c:v>0.68846963011491236</c:v>
+                </c:pt>
+                <c:pt idx="26">
+                  <c:v>0.48249576979049474</c:v>
+                </c:pt>
+                <c:pt idx="27">
+                  <c:v>0.26461890763090035</c:v>
+                </c:pt>
+                <c:pt idx="28">
+                  <c:v>8.9749752674184377E-2</c:v>
+                </c:pt>
+                <c:pt idx="29">
+                  <c:v>0.18027680454000214</c:v>
+                </c:pt>
+                <c:pt idx="30">
+                  <c:v>0.33588849975202034</c:v>
+                </c:pt>
+                <c:pt idx="31">
+                  <c:v>0.47017694327438608</c:v>
+                </c:pt>
+                <c:pt idx="32">
+                  <c:v>0.550833840433954</c:v>
+                </c:pt>
+                <c:pt idx="33">
+                  <c:v>0.61783452651840576</c:v>
+                </c:pt>
+                <c:pt idx="34">
+                  <c:v>0.62301357127170343</c:v>
+                </c:pt>
+                <c:pt idx="35">
+                  <c:v>0.59637709297432118</c:v>
+                </c:pt>
+                <c:pt idx="36">
+                  <c:v>0.4955990164426492</c:v>
+                </c:pt>
+                <c:pt idx="37">
+                  <c:v>0.36712617294924144</c:v>
+                </c:pt>
+                <c:pt idx="38">
+                  <c:v>0.21005772937152972</c:v>
+                </c:pt>
+                <c:pt idx="39">
+                  <c:v>9.6093784091629289E-2</c:v>
+                </c:pt>
+              </c:numCache>
+            </c:numRef>
+          </c:yVal>
+          <c:smooth val="1"/>
+          <c:extLst>
+            <c:ext xmlns:c16="http://schemas.microsoft.com/office/drawing/2014/chart" uri="{C3380CC4-5D6E-409C-BE32-E72D297353CC}">
+              <c16:uniqueId val="{00000000-165F-49C9-9B9F-D15163DFC13A}"/>
+            </c:ext>
+          </c:extLst>
+        </c:ser>
+        <c:ser>
+          <c:idx val="1"/>
+          <c:order val="1"/>
+          <c:tx>
+            <c:strRef>
+              <c:f>'561'!$F$1</c:f>
+              <c:strCache>
+                <c:ptCount val="1"/>
+                <c:pt idx="0">
+                  <c:v>60°</c:v>
+                </c:pt>
+              </c:strCache>
+            </c:strRef>
+          </c:tx>
+          <c:spPr>
+            <a:ln w="19050" cap="rnd">
+              <a:solidFill>
+                <a:schemeClr val="accent2"/>
+              </a:solidFill>
+              <a:round/>
+            </a:ln>
+            <a:effectLst/>
+          </c:spPr>
+          <c:marker>
+            <c:symbol val="circle"/>
+            <c:size val="5"/>
+            <c:spPr>
+              <a:solidFill>
+                <a:schemeClr val="accent2"/>
+              </a:solidFill>
+              <a:ln w="9525">
+                <a:solidFill>
+                  <a:schemeClr val="accent2"/>
+                </a:solidFill>
+              </a:ln>
+              <a:effectLst/>
+            </c:spPr>
+          </c:marker>
+          <c:xVal>
+            <c:numRef>
+              <c:f>'561'!$A$2:$A$41</c:f>
+              <c:numCache>
+                <c:formatCode>General</c:formatCode>
+                <c:ptCount val="40"/>
+                <c:pt idx="0">
+                  <c:v>-375</c:v>
+                </c:pt>
+                <c:pt idx="1">
+                  <c:v>-355.76923076923077</c:v>
+                </c:pt>
+                <c:pt idx="2">
+                  <c:v>-336.53846153846155</c:v>
+                </c:pt>
+                <c:pt idx="3">
+                  <c:v>-317.30769230769232</c:v>
+                </c:pt>
+                <c:pt idx="4">
+                  <c:v>-298.07692307692309</c:v>
+                </c:pt>
+                <c:pt idx="5">
+                  <c:v>-278.84615384615387</c:v>
+                </c:pt>
+                <c:pt idx="6">
+                  <c:v>-259.61538461538464</c:v>
+                </c:pt>
+                <c:pt idx="7">
+                  <c:v>-240.38461538461542</c:v>
+                </c:pt>
+                <c:pt idx="8">
+                  <c:v>-221.15384615384619</c:v>
+                </c:pt>
+                <c:pt idx="9">
+                  <c:v>-201.92307692307696</c:v>
+                </c:pt>
+                <c:pt idx="10">
+                  <c:v>-182.69230769230774</c:v>
+                </c:pt>
+                <c:pt idx="11">
+                  <c:v>-163.46153846153851</c:v>
+                </c:pt>
+                <c:pt idx="12">
+                  <c:v>-144.23076923076928</c:v>
+                </c:pt>
+                <c:pt idx="13">
+                  <c:v>-125.00000000000006</c:v>
+                </c:pt>
+                <c:pt idx="14">
+                  <c:v>-105.76923076923083</c:v>
+                </c:pt>
+                <c:pt idx="15">
+                  <c:v>-86.538461538461604</c:v>
+                </c:pt>
+                <c:pt idx="16">
+                  <c:v>-67.307692307692378</c:v>
+                </c:pt>
+                <c:pt idx="17">
+                  <c:v>-48.076923076923151</c:v>
+                </c:pt>
+                <c:pt idx="18">
+                  <c:v>-28.846153846153921</c:v>
+                </c:pt>
+                <c:pt idx="19">
+                  <c:v>-9.6153846153846914</c:v>
+                </c:pt>
+                <c:pt idx="20">
+                  <c:v>9.6153846153845386</c:v>
+                </c:pt>
+                <c:pt idx="21">
+                  <c:v>28.846153846153769</c:v>
+                </c:pt>
+                <c:pt idx="22">
+                  <c:v>48.076923076922995</c:v>
+                </c:pt>
+                <c:pt idx="23">
+                  <c:v>67.307692307692221</c:v>
+                </c:pt>
+                <c:pt idx="24">
+                  <c:v>86.538461538461448</c:v>
+                </c:pt>
+                <c:pt idx="25">
+                  <c:v>105.76923076923067</c:v>
+                </c:pt>
+                <c:pt idx="26">
+                  <c:v>124.9999999999999</c:v>
+                </c:pt>
+                <c:pt idx="27">
+                  <c:v>144.23076923076914</c:v>
+                </c:pt>
+                <c:pt idx="28">
+                  <c:v>163.46153846153837</c:v>
+                </c:pt>
+                <c:pt idx="29">
+                  <c:v>182.69230769230759</c:v>
+                </c:pt>
+                <c:pt idx="30">
+                  <c:v>201.92307692307682</c:v>
+                </c:pt>
+                <c:pt idx="31">
+                  <c:v>221.15384615384605</c:v>
+                </c:pt>
+                <c:pt idx="32">
+                  <c:v>240.38461538461527</c:v>
+                </c:pt>
+                <c:pt idx="33">
+                  <c:v>259.61538461538453</c:v>
+                </c:pt>
+                <c:pt idx="34">
+                  <c:v>278.84615384615375</c:v>
+                </c:pt>
+                <c:pt idx="35">
+                  <c:v>298.07692307692298</c:v>
+                </c:pt>
+                <c:pt idx="36">
+                  <c:v>317.30769230769221</c:v>
+                </c:pt>
+                <c:pt idx="37">
+                  <c:v>336.53846153846143</c:v>
+                </c:pt>
+                <c:pt idx="38">
+                  <c:v>355.76923076923066</c:v>
+                </c:pt>
+                <c:pt idx="39">
+                  <c:v>375</c:v>
+                </c:pt>
+              </c:numCache>
+            </c:numRef>
+          </c:xVal>
+          <c:yVal>
+            <c:numRef>
+              <c:f>'561'!$F$2:$F$41</c:f>
+              <c:numCache>
+                <c:formatCode>General</c:formatCode>
+                <c:ptCount val="40"/>
+                <c:pt idx="0">
+                  <c:v>0.12452148026953938</c:v>
+                </c:pt>
+                <c:pt idx="1">
+                  <c:v>0.23659260603721388</c:v>
+                </c:pt>
+                <c:pt idx="2">
+                  <c:v>0.42929329945215938</c:v>
+                </c:pt>
+                <c:pt idx="3">
+                  <c:v>0.63562293625955724</c:v>
+                </c:pt>
+                <c:pt idx="4">
+                  <c:v>0.80650148428085522</c:v>
+                </c:pt>
+                <c:pt idx="5">
+                  <c:v>0.93500357231857634</c:v>
+                </c:pt>
+                <c:pt idx="6">
+                  <c:v>0.99933045389769637</c:v>
+                </c:pt>
+                <c:pt idx="7">
+                  <c:v>0.99625102726791492</c:v>
+                </c:pt>
+                <c:pt idx="8">
+                  <c:v>0.92408737096452465</c:v>
+                </c:pt>
+                <c:pt idx="9">
+                  <c:v>0.79979015098001127</c:v>
+                </c:pt>
+                <c:pt idx="10">
+                  <c:v>0.62888073662252952</c:v>
+                </c:pt>
+                <c:pt idx="11">
+                  <c:v>0.42528852812844137</c:v>
+                </c:pt>
+                <c:pt idx="12">
+                  <c:v>0.21794190192699525</c:v>
+                </c:pt>
+                <c:pt idx="13">
+                  <c:v>0.12402798785126216</c:v>
+                </c:pt>
+                <c:pt idx="14">
+                  <c:v>0.23401294099080119</c:v>
+                </c:pt>
+                <c:pt idx="15">
+                  <c:v>0.38983073155726816</c:v>
+                </c:pt>
+                <c:pt idx="16">
+                  <c:v>0.52094689804117922</c:v>
+                </c:pt>
+                <c:pt idx="17">
+                  <c:v>0.61531794714071797</c:v>
+                </c:pt>
+                <c:pt idx="18">
+                  <c:v>0.65512443677216003</c:v>
+                </c:pt>
+                <c:pt idx="19">
+                  <c:v>0.63748094594608418</c:v>
+                </c:pt>
+                <c:pt idx="20">
+                  <c:v>0.55193241578541841</c:v>
+                </c:pt>
+                <c:pt idx="21">
+                  <c:v>0.43390969733544793</c:v>
+                </c:pt>
+                <c:pt idx="22">
+                  <c:v>0.28475471575749539</c:v>
+                </c:pt>
+                <c:pt idx="23">
+                  <c:v>0.13757797423096638</c:v>
+                </c:pt>
+                <c:pt idx="24">
+                  <c:v>0.17438607095858022</c:v>
+                </c:pt>
+                <c:pt idx="25">
+                  <c:v>0.3813195390579181</c:v>
+                </c:pt>
+                <c:pt idx="26">
+                  <c:v>0.58365204080701416</c:v>
+                </c:pt>
+                <c:pt idx="27">
+                  <c:v>0.76939870123836784</c:v>
+                </c:pt>
+                <c:pt idx="28">
+                  <c:v>0.89918760457818003</c:v>
+                </c:pt>
+                <c:pt idx="29">
+                  <c:v>0.98546620737297319</c:v>
+                </c:pt>
+                <c:pt idx="30">
+                  <c:v>1</c:v>
+                </c:pt>
+                <c:pt idx="31">
+                  <c:v>0.95089269515534947</c:v>
+                </c:pt>
+                <c:pt idx="32">
+                  <c:v>0.82565060108279908</c:v>
+                </c:pt>
+                <c:pt idx="33">
+                  <c:v>0.66595208540705186</c:v>
+                </c:pt>
+                <c:pt idx="34">
+                  <c:v>0.46745547669550158</c:v>
+                </c:pt>
+                <c:pt idx="35">
+                  <c:v>0.26934756835852547</c:v>
+                </c:pt>
+                <c:pt idx="36">
+                  <c:v>0.13082954639138508</c:v>
+                </c:pt>
+                <c:pt idx="37">
+                  <c:v>0.17242649897733853</c:v>
+                </c:pt>
+                <c:pt idx="38">
+                  <c:v>0.33175021313223846</c:v>
+                </c:pt>
+                <c:pt idx="39">
+                  <c:v>0.45851461436743618</c:v>
+                </c:pt>
+              </c:numCache>
+            </c:numRef>
+          </c:yVal>
+          <c:smooth val="1"/>
+          <c:extLst>
+            <c:ext xmlns:c16="http://schemas.microsoft.com/office/drawing/2014/chart" uri="{C3380CC4-5D6E-409C-BE32-E72D297353CC}">
+              <c16:uniqueId val="{00000001-165F-49C9-9B9F-D15163DFC13A}"/>
+            </c:ext>
+          </c:extLst>
+        </c:ser>
+        <c:ser>
+          <c:idx val="2"/>
+          <c:order val="2"/>
+          <c:tx>
+            <c:strRef>
+              <c:f>'561'!$G$1</c:f>
+              <c:strCache>
+                <c:ptCount val="1"/>
+                <c:pt idx="0">
+                  <c:v>120°</c:v>
+                </c:pt>
+              </c:strCache>
+            </c:strRef>
+          </c:tx>
+          <c:spPr>
+            <a:ln w="19050" cap="rnd">
+              <a:solidFill>
+                <a:schemeClr val="accent3"/>
+              </a:solidFill>
+              <a:round/>
+            </a:ln>
+            <a:effectLst/>
+          </c:spPr>
+          <c:marker>
+            <c:symbol val="circle"/>
+            <c:size val="5"/>
+            <c:spPr>
+              <a:solidFill>
+                <a:schemeClr val="accent3"/>
+              </a:solidFill>
+              <a:ln w="9525">
+                <a:solidFill>
+                  <a:schemeClr val="accent3"/>
+                </a:solidFill>
+              </a:ln>
+              <a:effectLst/>
+            </c:spPr>
+          </c:marker>
+          <c:xVal>
+            <c:numRef>
+              <c:f>'561'!$A$2:$A$41</c:f>
+              <c:numCache>
+                <c:formatCode>General</c:formatCode>
+                <c:ptCount val="40"/>
+                <c:pt idx="0">
+                  <c:v>-375</c:v>
+                </c:pt>
+                <c:pt idx="1">
+                  <c:v>-355.76923076923077</c:v>
+                </c:pt>
+                <c:pt idx="2">
+                  <c:v>-336.53846153846155</c:v>
+                </c:pt>
+                <c:pt idx="3">
+                  <c:v>-317.30769230769232</c:v>
+                </c:pt>
+                <c:pt idx="4">
+                  <c:v>-298.07692307692309</c:v>
+                </c:pt>
+                <c:pt idx="5">
+                  <c:v>-278.84615384615387</c:v>
+                </c:pt>
+                <c:pt idx="6">
+                  <c:v>-259.61538461538464</c:v>
+                </c:pt>
+                <c:pt idx="7">
+                  <c:v>-240.38461538461542</c:v>
+                </c:pt>
+                <c:pt idx="8">
+                  <c:v>-221.15384615384619</c:v>
+                </c:pt>
+                <c:pt idx="9">
+                  <c:v>-201.92307692307696</c:v>
+                </c:pt>
+                <c:pt idx="10">
+                  <c:v>-182.69230769230774</c:v>
+                </c:pt>
+                <c:pt idx="11">
+                  <c:v>-163.46153846153851</c:v>
+                </c:pt>
+                <c:pt idx="12">
+                  <c:v>-144.23076923076928</c:v>
+                </c:pt>
+                <c:pt idx="13">
+                  <c:v>-125.00000000000006</c:v>
+                </c:pt>
+                <c:pt idx="14">
+                  <c:v>-105.76923076923083</c:v>
+                </c:pt>
+                <c:pt idx="15">
+                  <c:v>-86.538461538461604</c:v>
+                </c:pt>
+                <c:pt idx="16">
+                  <c:v>-67.307692307692378</c:v>
+                </c:pt>
+                <c:pt idx="17">
+                  <c:v>-48.076923076923151</c:v>
+                </c:pt>
+                <c:pt idx="18">
+                  <c:v>-28.846153846153921</c:v>
+                </c:pt>
+                <c:pt idx="19">
+                  <c:v>-9.6153846153846914</c:v>
+                </c:pt>
+                <c:pt idx="20">
+                  <c:v>9.6153846153845386</c:v>
+                </c:pt>
+                <c:pt idx="21">
+                  <c:v>28.846153846153769</c:v>
+                </c:pt>
+                <c:pt idx="22">
+                  <c:v>48.076923076922995</c:v>
+                </c:pt>
+                <c:pt idx="23">
+                  <c:v>67.307692307692221</c:v>
+                </c:pt>
+                <c:pt idx="24">
+                  <c:v>86.538461538461448</c:v>
+                </c:pt>
+                <c:pt idx="25">
+                  <c:v>105.76923076923067</c:v>
+                </c:pt>
+                <c:pt idx="26">
+                  <c:v>124.9999999999999</c:v>
+                </c:pt>
+                <c:pt idx="27">
+                  <c:v>144.23076923076914</c:v>
+                </c:pt>
+                <c:pt idx="28">
+                  <c:v>163.46153846153837</c:v>
+                </c:pt>
+                <c:pt idx="29">
+                  <c:v>182.69230769230759</c:v>
+                </c:pt>
+                <c:pt idx="30">
+                  <c:v>201.92307692307682</c:v>
+                </c:pt>
+                <c:pt idx="31">
+                  <c:v>221.15384615384605</c:v>
+                </c:pt>
+                <c:pt idx="32">
+                  <c:v>240.38461538461527</c:v>
+                </c:pt>
+                <c:pt idx="33">
+                  <c:v>259.61538461538453</c:v>
+                </c:pt>
+                <c:pt idx="34">
+                  <c:v>278.84615384615375</c:v>
+                </c:pt>
+                <c:pt idx="35">
+                  <c:v>298.07692307692298</c:v>
+                </c:pt>
+                <c:pt idx="36">
+                  <c:v>317.30769230769221</c:v>
+                </c:pt>
+                <c:pt idx="37">
+                  <c:v>336.53846153846143</c:v>
+                </c:pt>
+                <c:pt idx="38">
+                  <c:v>355.76923076923066</c:v>
+                </c:pt>
+                <c:pt idx="39">
+                  <c:v>375</c:v>
+                </c:pt>
+              </c:numCache>
+            </c:numRef>
+          </c:xVal>
+          <c:yVal>
+            <c:numRef>
+              <c:f>'561'!$G$2:$G$41</c:f>
+              <c:numCache>
+                <c:formatCode>General</c:formatCode>
+                <c:ptCount val="40"/>
+                <c:pt idx="0">
+                  <c:v>0.52510059548808818</c:v>
+                </c:pt>
+                <c:pt idx="1">
+                  <c:v>0.58522384230784641</c:v>
+                </c:pt>
+                <c:pt idx="2">
+                  <c:v>0.63634693539731824</c:v>
+                </c:pt>
+                <c:pt idx="3">
+                  <c:v>0.62723393697614949</c:v>
+                </c:pt>
+                <c:pt idx="4">
+                  <c:v>0.58422682680344484</c:v>
+                </c:pt>
+                <c:pt idx="5">
+                  <c:v>0.46671147598399026</c:v>
+                </c:pt>
+                <c:pt idx="6">
+                  <c:v>0.31450724429868554</c:v>
+                </c:pt>
+                <c:pt idx="7">
+                  <c:v>0.18085496900409775</c:v>
+                </c:pt>
+                <c:pt idx="8">
+                  <c:v>0.13786130070104174</c:v>
+                </c:pt>
+                <c:pt idx="9">
+                  <c:v>0.29914671544096172</c:v>
+                </c:pt>
+                <c:pt idx="10">
+                  <c:v>0.51668058977999087</c:v>
+                </c:pt>
+                <c:pt idx="11">
+                  <c:v>0.7102671217191352</c:v>
+                </c:pt>
+                <c:pt idx="12">
+                  <c:v>0.85495721727418728</c:v>
+                </c:pt>
+                <c:pt idx="13">
+                  <c:v>0.96207093928239684</c:v>
+                </c:pt>
+                <c:pt idx="14">
+                  <c:v>1</c:v>
+                </c:pt>
+                <c:pt idx="15">
+                  <c:v>0.96999173882033829</c:v>
+                </c:pt>
+                <c:pt idx="16">
+                  <c:v>0.87398444547161214</c:v>
+                </c:pt>
+                <c:pt idx="17">
+                  <c:v>0.73352213905709707</c:v>
+                </c:pt>
+                <c:pt idx="18">
+                  <c:v>0.53860211213009568</c:v>
+                </c:pt>
+                <c:pt idx="19">
+                  <c:v>0.32067277176581016</c:v>
+                </c:pt>
+                <c:pt idx="20">
+                  <c:v>0.12184312082851707</c:v>
+                </c:pt>
+                <c:pt idx="21">
+                  <c:v>0.16140223689071209</c:v>
+                </c:pt>
+                <c:pt idx="22">
+                  <c:v>0.30437011870461667</c:v>
+                </c:pt>
+                <c:pt idx="23">
+                  <c:v>0.4579184152138574</c:v>
+                </c:pt>
+                <c:pt idx="24">
+                  <c:v>0.56881258144243485</c:v>
+                </c:pt>
+                <c:pt idx="25">
+                  <c:v>0.61593468064492618</c:v>
+                </c:pt>
+                <c:pt idx="26">
+                  <c:v>0.64829787768772196</c:v>
+                </c:pt>
+                <c:pt idx="27">
+                  <c:v>0.58679715461431048</c:v>
+                </c:pt>
+                <c:pt idx="28">
+                  <c:v>0.485847299061617</c:v>
+                </c:pt>
+                <c:pt idx="29">
+                  <c:v>0.35923559068638711</c:v>
+                </c:pt>
+                <c:pt idx="30">
+                  <c:v>0.21439680425048949</c:v>
+                </c:pt>
+                <c:pt idx="31">
+                  <c:v>0.13988248148550247</c:v>
+                </c:pt>
+                <c:pt idx="32">
+                  <c:v>0.25858103395757037</c:v>
+                </c:pt>
+                <c:pt idx="33">
+                  <c:v>0.47019219067131135</c:v>
+                </c:pt>
+                <c:pt idx="34">
+                  <c:v>0.66659652830242144</c:v>
+                </c:pt>
+                <c:pt idx="35">
+                  <c:v>0.82822299994490123</c:v>
+                </c:pt>
+                <c:pt idx="36">
+                  <c:v>0.94668689462582334</c:v>
+                </c:pt>
+                <c:pt idx="37">
+                  <c:v>0.99983122760490428</c:v>
+                </c:pt>
+                <c:pt idx="38">
+                  <c:v>0.98607545497088345</c:v>
+                </c:pt>
+                <c:pt idx="39">
+                  <c:v>0.92394268881799724</c:v>
+                </c:pt>
+              </c:numCache>
+            </c:numRef>
+          </c:yVal>
+          <c:smooth val="1"/>
+          <c:extLst>
+            <c:ext xmlns:c16="http://schemas.microsoft.com/office/drawing/2014/chart" uri="{C3380CC4-5D6E-409C-BE32-E72D297353CC}">
+              <c16:uniqueId val="{00000002-165F-49C9-9B9F-D15163DFC13A}"/>
+            </c:ext>
+          </c:extLst>
+        </c:ser>
+        <c:dLbls>
+          <c:showLegendKey val="0"/>
+          <c:showVal val="0"/>
+          <c:showCatName val="0"/>
+          <c:showSerName val="0"/>
+          <c:showPercent val="0"/>
+          <c:showBubbleSize val="0"/>
+        </c:dLbls>
+        <c:axId val="496183224"/>
+        <c:axId val="496185184"/>
+      </c:scatterChart>
+      <c:valAx>
+        <c:axId val="496183224"/>
+        <c:scaling>
+          <c:orientation val="minMax"/>
+          <c:max val="400"/>
+          <c:min val="-400"/>
+        </c:scaling>
+        <c:delete val="0"/>
+        <c:axPos val="b"/>
+        <c:majorGridlines>
+          <c:spPr>
+            <a:ln w="9525" cap="flat" cmpd="sng" algn="ctr">
+              <a:solidFill>
+                <a:schemeClr val="tx1">
+                  <a:lumMod val="15000"/>
+                  <a:lumOff val="85000"/>
+                </a:schemeClr>
+              </a:solidFill>
+              <a:round/>
+            </a:ln>
+            <a:effectLst/>
+          </c:spPr>
+        </c:majorGridlines>
+        <c:title>
+          <c:tx>
+            <c:rich>
+              <a:bodyPr rot="0" spcFirstLastPara="1" vertOverflow="ellipsis" vert="horz" wrap="square" anchor="ctr" anchorCtr="1"/>
+              <a:lstStyle/>
+              <a:p>
+                <a:pPr>
+                  <a:defRPr sz="1500" b="0" i="0" u="none" strike="noStrike" kern="1200" baseline="0">
+                    <a:solidFill>
+                      <a:schemeClr val="tx1">
+                        <a:lumMod val="65000"/>
+                        <a:lumOff val="35000"/>
+                      </a:schemeClr>
+                    </a:solidFill>
+                    <a:latin typeface="+mn-lt"/>
+                    <a:ea typeface="+mn-ea"/>
+                    <a:cs typeface="+mn-cs"/>
+                  </a:defRPr>
+                </a:pPr>
+                <a:r>
+                  <a:rPr lang="en-GB" sz="1500" dirty="0" err="1"/>
+                  <a:t>Pockels</a:t>
+                </a:r>
+                <a:r>
+                  <a:rPr lang="en-GB" sz="1500" dirty="0"/>
+                  <a:t> cell voltage (V)</a:t>
+                </a:r>
+              </a:p>
+            </c:rich>
+          </c:tx>
+          <c:layout>
+            <c:manualLayout>
+              <c:xMode val="edge"/>
+              <c:yMode val="edge"/>
+              <c:x val="0.40516206307544894"/>
+              <c:y val="0.85873413971401724"/>
+            </c:manualLayout>
+          </c:layout>
+          <c:overlay val="0"/>
+          <c:spPr>
+            <a:noFill/>
+            <a:ln>
+              <a:noFill/>
+            </a:ln>
+            <a:effectLst/>
+          </c:spPr>
+          <c:txPr>
+            <a:bodyPr rot="0" spcFirstLastPara="1" vertOverflow="ellipsis" vert="horz" wrap="square" anchor="ctr" anchorCtr="1"/>
+            <a:lstStyle/>
+            <a:p>
+              <a:pPr>
+                <a:defRPr sz="1500" b="0" i="0" u="none" strike="noStrike" kern="1200" baseline="0">
+                  <a:solidFill>
+                    <a:schemeClr val="tx1">
+                      <a:lumMod val="65000"/>
+                      <a:lumOff val="35000"/>
+                    </a:schemeClr>
+                  </a:solidFill>
+                  <a:latin typeface="+mn-lt"/>
+                  <a:ea typeface="+mn-ea"/>
+                  <a:cs typeface="+mn-cs"/>
+                </a:defRPr>
+              </a:pPr>
+              <a:endParaRPr lang="en-US"/>
+            </a:p>
+          </c:txPr>
+        </c:title>
+        <c:numFmt formatCode="General" sourceLinked="1"/>
+        <c:majorTickMark val="none"/>
+        <c:minorTickMark val="none"/>
+        <c:tickLblPos val="nextTo"/>
+        <c:spPr>
+          <a:noFill/>
+          <a:ln w="9525" cap="flat" cmpd="sng" algn="ctr">
+            <a:solidFill>
+              <a:schemeClr val="tx1">
+                <a:lumMod val="25000"/>
+                <a:lumOff val="75000"/>
+              </a:schemeClr>
+            </a:solidFill>
+            <a:round/>
+          </a:ln>
+          <a:effectLst/>
+        </c:spPr>
+        <c:txPr>
+          <a:bodyPr rot="-60000000" spcFirstLastPara="1" vertOverflow="ellipsis" vert="horz" wrap="square" anchor="ctr" anchorCtr="1"/>
+          <a:lstStyle/>
+          <a:p>
+            <a:pPr>
+              <a:defRPr sz="1500" b="0" i="0" u="none" strike="noStrike" kern="1200" baseline="0">
+                <a:solidFill>
+                  <a:schemeClr val="tx1">
+                    <a:lumMod val="65000"/>
+                    <a:lumOff val="35000"/>
+                  </a:schemeClr>
+                </a:solidFill>
+                <a:latin typeface="+mn-lt"/>
+                <a:ea typeface="+mn-ea"/>
+                <a:cs typeface="+mn-cs"/>
+              </a:defRPr>
+            </a:pPr>
+            <a:endParaRPr lang="en-US"/>
+          </a:p>
+        </c:txPr>
+        <c:crossAx val="496185184"/>
+        <c:crosses val="autoZero"/>
+        <c:crossBetween val="midCat"/>
+        <c:majorUnit val="50"/>
+        <c:minorUnit val="10"/>
+      </c:valAx>
+      <c:valAx>
+        <c:axId val="496185184"/>
+        <c:scaling>
+          <c:orientation val="minMax"/>
+          <c:max val="1.05"/>
+          <c:min val="0"/>
+        </c:scaling>
+        <c:delete val="0"/>
+        <c:axPos val="l"/>
+        <c:majorGridlines>
+          <c:spPr>
+            <a:ln w="9525" cap="flat" cmpd="sng" algn="ctr">
+              <a:solidFill>
+                <a:schemeClr val="bg1">
+                  <a:lumMod val="75000"/>
+                </a:schemeClr>
+              </a:solidFill>
+              <a:round/>
+            </a:ln>
+            <a:effectLst/>
+          </c:spPr>
+        </c:majorGridlines>
+        <c:numFmt formatCode="General" sourceLinked="1"/>
+        <c:majorTickMark val="none"/>
+        <c:minorTickMark val="none"/>
+        <c:tickLblPos val="nextTo"/>
+        <c:spPr>
+          <a:noFill/>
+          <a:ln w="9525" cap="flat" cmpd="sng" algn="ctr">
+            <a:solidFill>
+              <a:schemeClr val="tx1">
+                <a:lumMod val="25000"/>
+                <a:lumOff val="75000"/>
+              </a:schemeClr>
+            </a:solidFill>
+            <a:round/>
+          </a:ln>
+          <a:effectLst/>
+        </c:spPr>
+        <c:txPr>
+          <a:bodyPr rot="-60000000" spcFirstLastPara="1" vertOverflow="ellipsis" vert="horz" wrap="square" anchor="ctr" anchorCtr="1"/>
+          <a:lstStyle/>
+          <a:p>
+            <a:pPr>
+              <a:defRPr sz="1500" b="0" i="0" u="none" strike="noStrike" kern="1200" baseline="0">
+                <a:solidFill>
+                  <a:schemeClr val="tx1">
+                    <a:lumMod val="65000"/>
+                    <a:lumOff val="35000"/>
+                  </a:schemeClr>
+                </a:solidFill>
+                <a:latin typeface="+mn-lt"/>
+                <a:ea typeface="+mn-ea"/>
+                <a:cs typeface="+mn-cs"/>
+              </a:defRPr>
+            </a:pPr>
+            <a:endParaRPr lang="en-US"/>
+          </a:p>
+        </c:txPr>
+        <c:crossAx val="496183224"/>
+        <c:crosses val="autoZero"/>
+        <c:crossBetween val="midCat"/>
+        <c:majorUnit val="0.2"/>
+        <c:minorUnit val="2.0000000000000004E-2"/>
+      </c:valAx>
+      <c:spPr>
+        <a:noFill/>
+        <a:ln>
+          <a:noFill/>
+        </a:ln>
+        <a:effectLst/>
+      </c:spPr>
+    </c:plotArea>
+    <c:legend>
+      <c:legendPos val="b"/>
+      <c:overlay val="0"/>
+      <c:spPr>
+        <a:noFill/>
+        <a:ln>
+          <a:noFill/>
+        </a:ln>
+        <a:effectLst/>
+      </c:spPr>
+      <c:txPr>
+        <a:bodyPr rot="0" spcFirstLastPara="1" vertOverflow="ellipsis" vert="horz" wrap="square" anchor="ctr" anchorCtr="1"/>
+        <a:lstStyle/>
+        <a:p>
+          <a:pPr>
+            <a:defRPr sz="1500" b="0" i="0" u="none" strike="noStrike" kern="1200" baseline="0">
+              <a:solidFill>
+                <a:schemeClr val="tx1">
+                  <a:lumMod val="65000"/>
+                  <a:lumOff val="35000"/>
+                </a:schemeClr>
+              </a:solidFill>
+              <a:latin typeface="+mn-lt"/>
+              <a:ea typeface="+mn-ea"/>
+              <a:cs typeface="+mn-cs"/>
+            </a:defRPr>
+          </a:pPr>
+          <a:endParaRPr lang="en-US"/>
+        </a:p>
+      </c:txPr>
+    </c:legend>
+    <c:plotVisOnly val="1"/>
+    <c:dispBlanksAs val="gap"/>
+    <c:showDLblsOverMax val="0"/>
+  </c:chart>
+  <c:spPr>
+    <a:noFill/>
+    <a:ln>
+      <a:noFill/>
+    </a:ln>
+    <a:effectLst/>
+  </c:spPr>
+  <c:txPr>
+    <a:bodyPr/>
+    <a:lstStyle/>
+    <a:p>
+      <a:pPr>
+        <a:defRPr/>
+      </a:pPr>
+      <a:endParaRPr lang="en-US"/>
+    </a:p>
+  </c:txPr>
+  <c:externalData r:id="rId3">
+    <c:autoUpdate val="0"/>
+  </c:externalData>
+</c:chartSpace>
+</file>
+
 <file path=ppt/charts/colors1.xml><?xml version="1.0" encoding="utf-8"?>
+<cs:colorStyle xmlns:cs="http://schemas.microsoft.com/office/drawing/2012/chartStyle" xmlns:a="http://schemas.openxmlformats.org/drawingml/2006/main" meth="cycle" id="10">
+  <a:schemeClr val="accent1"/>
+  <a:schemeClr val="accent2"/>
+  <a:schemeClr val="accent3"/>
+  <a:schemeClr val="accent4"/>
+  <a:schemeClr val="accent5"/>
+  <a:schemeClr val="accent6"/>
+  <cs:variation/>
+  <cs:variation>
+    <a:lumMod val="60000"/>
+  </cs:variation>
+  <cs:variation>
+    <a:lumMod val="80000"/>
+    <a:lumOff val="20000"/>
+  </cs:variation>
+  <cs:variation>
+    <a:lumMod val="80000"/>
+  </cs:variation>
+  <cs:variation>
+    <a:lumMod val="60000"/>
+    <a:lumOff val="40000"/>
+  </cs:variation>
+  <cs:variation>
+    <a:lumMod val="50000"/>
+  </cs:variation>
+  <cs:variation>
+    <a:lumMod val="70000"/>
+    <a:lumOff val="30000"/>
+  </cs:variation>
+  <cs:variation>
+    <a:lumMod val="70000"/>
+  </cs:variation>
+  <cs:variation>
+    <a:lumMod val="50000"/>
+    <a:lumOff val="50000"/>
+  </cs:variation>
+</cs:colorStyle>
+</file>
+
+<file path=ppt/charts/colors2.xml><?xml version="1.0" encoding="utf-8"?>
 <cs:colorStyle xmlns:cs="http://schemas.microsoft.com/office/drawing/2012/chartStyle" xmlns:a="http://schemas.openxmlformats.org/drawingml/2006/main" meth="cycle" id="10">
   <a:schemeClr val="accent1"/>
   <a:schemeClr val="accent2"/>
@@ -1920,6 +3274,522 @@
 </cs:chartStyle>
 </file>
 
+<file path=ppt/charts/style2.xml><?xml version="1.0" encoding="utf-8"?>
+<cs:chartStyle xmlns:cs="http://schemas.microsoft.com/office/drawing/2012/chartStyle" xmlns:a="http://schemas.openxmlformats.org/drawingml/2006/main" id="240">
+  <cs:axisTitle>
+    <cs:lnRef idx="0"/>
+    <cs:fillRef idx="0"/>
+    <cs:effectRef idx="0"/>
+    <cs:fontRef idx="minor">
+      <a:schemeClr val="tx1">
+        <a:lumMod val="65000"/>
+        <a:lumOff val="35000"/>
+      </a:schemeClr>
+    </cs:fontRef>
+    <cs:defRPr sz="1000" kern="1200"/>
+  </cs:axisTitle>
+  <cs:categoryAxis>
+    <cs:lnRef idx="0"/>
+    <cs:fillRef idx="0"/>
+    <cs:effectRef idx="0"/>
+    <cs:fontRef idx="minor">
+      <a:schemeClr val="tx1">
+        <a:lumMod val="65000"/>
+        <a:lumOff val="35000"/>
+      </a:schemeClr>
+    </cs:fontRef>
+    <cs:spPr>
+      <a:ln w="9525" cap="flat" cmpd="sng" algn="ctr">
+        <a:solidFill>
+          <a:schemeClr val="tx1">
+            <a:lumMod val="25000"/>
+            <a:lumOff val="75000"/>
+          </a:schemeClr>
+        </a:solidFill>
+        <a:round/>
+      </a:ln>
+    </cs:spPr>
+    <cs:defRPr sz="900" kern="1200"/>
+  </cs:categoryAxis>
+  <cs:chartArea mods="allowNoFillOverride allowNoLineOverride">
+    <cs:lnRef idx="0"/>
+    <cs:fillRef idx="0"/>
+    <cs:effectRef idx="0"/>
+    <cs:fontRef idx="minor">
+      <a:schemeClr val="tx1"/>
+    </cs:fontRef>
+    <cs:spPr>
+      <a:solidFill>
+        <a:schemeClr val="bg1"/>
+      </a:solidFill>
+      <a:ln w="9525" cap="flat" cmpd="sng" algn="ctr">
+        <a:solidFill>
+          <a:schemeClr val="tx1">
+            <a:lumMod val="15000"/>
+            <a:lumOff val="85000"/>
+          </a:schemeClr>
+        </a:solidFill>
+        <a:round/>
+      </a:ln>
+    </cs:spPr>
+    <cs:defRPr sz="1000" kern="1200"/>
+  </cs:chartArea>
+  <cs:dataLabel>
+    <cs:lnRef idx="0"/>
+    <cs:fillRef idx="0"/>
+    <cs:effectRef idx="0"/>
+    <cs:fontRef idx="minor">
+      <a:schemeClr val="tx1">
+        <a:lumMod val="75000"/>
+        <a:lumOff val="25000"/>
+      </a:schemeClr>
+    </cs:fontRef>
+    <cs:defRPr sz="900" kern="1200"/>
+  </cs:dataLabel>
+  <cs:dataLabelCallout>
+    <cs:lnRef idx="0"/>
+    <cs:fillRef idx="0"/>
+    <cs:effectRef idx="0"/>
+    <cs:fontRef idx="minor">
+      <a:schemeClr val="dk1">
+        <a:lumMod val="65000"/>
+        <a:lumOff val="35000"/>
+      </a:schemeClr>
+    </cs:fontRef>
+    <cs:spPr>
+      <a:solidFill>
+        <a:schemeClr val="lt1"/>
+      </a:solidFill>
+      <a:ln>
+        <a:solidFill>
+          <a:schemeClr val="dk1">
+            <a:lumMod val="25000"/>
+            <a:lumOff val="75000"/>
+          </a:schemeClr>
+        </a:solidFill>
+      </a:ln>
+    </cs:spPr>
+    <cs:defRPr sz="900" kern="1200"/>
+    <cs:bodyPr rot="0" spcFirstLastPara="1" vertOverflow="clip" horzOverflow="clip" vert="horz" wrap="square" lIns="36576" tIns="18288" rIns="36576" bIns="18288" anchor="ctr" anchorCtr="1">
+      <a:spAutoFit/>
+    </cs:bodyPr>
+  </cs:dataLabelCallout>
+  <cs:dataPoint>
+    <cs:lnRef idx="0"/>
+    <cs:fillRef idx="1">
+      <cs:styleClr val="auto"/>
+    </cs:fillRef>
+    <cs:effectRef idx="0"/>
+    <cs:fontRef idx="minor">
+      <a:schemeClr val="tx1"/>
+    </cs:fontRef>
+  </cs:dataPoint>
+  <cs:dataPoint3D>
+    <cs:lnRef idx="0"/>
+    <cs:fillRef idx="1">
+      <cs:styleClr val="auto"/>
+    </cs:fillRef>
+    <cs:effectRef idx="0"/>
+    <cs:fontRef idx="minor">
+      <a:schemeClr val="tx1"/>
+    </cs:fontRef>
+  </cs:dataPoint3D>
+  <cs:dataPointLine>
+    <cs:lnRef idx="0">
+      <cs:styleClr val="auto"/>
+    </cs:lnRef>
+    <cs:fillRef idx="1"/>
+    <cs:effectRef idx="0"/>
+    <cs:fontRef idx="minor">
+      <a:schemeClr val="tx1"/>
+    </cs:fontRef>
+    <cs:spPr>
+      <a:ln w="19050" cap="rnd">
+        <a:solidFill>
+          <a:schemeClr val="phClr"/>
+        </a:solidFill>
+        <a:round/>
+      </a:ln>
+    </cs:spPr>
+  </cs:dataPointLine>
+  <cs:dataPointMarker>
+    <cs:lnRef idx="0">
+      <cs:styleClr val="auto"/>
+    </cs:lnRef>
+    <cs:fillRef idx="1">
+      <cs:styleClr val="auto"/>
+    </cs:fillRef>
+    <cs:effectRef idx="0"/>
+    <cs:fontRef idx="minor">
+      <a:schemeClr val="tx1"/>
+    </cs:fontRef>
+    <cs:spPr>
+      <a:ln w="9525">
+        <a:solidFill>
+          <a:schemeClr val="phClr"/>
+        </a:solidFill>
+      </a:ln>
+    </cs:spPr>
+  </cs:dataPointMarker>
+  <cs:dataPointMarkerLayout symbol="circle" size="5"/>
+  <cs:dataPointWireframe>
+    <cs:lnRef idx="0">
+      <cs:styleClr val="auto"/>
+    </cs:lnRef>
+    <cs:fillRef idx="0"/>
+    <cs:effectRef idx="0"/>
+    <cs:fontRef idx="minor">
+      <a:schemeClr val="dk1"/>
+    </cs:fontRef>
+    <cs:spPr>
+      <a:ln w="9525" cap="rnd">
+        <a:solidFill>
+          <a:schemeClr val="phClr"/>
+        </a:solidFill>
+        <a:round/>
+      </a:ln>
+    </cs:spPr>
+  </cs:dataPointWireframe>
+  <cs:dataTable>
+    <cs:lnRef idx="0"/>
+    <cs:fillRef idx="0"/>
+    <cs:effectRef idx="0"/>
+    <cs:fontRef idx="minor">
+      <a:schemeClr val="tx1">
+        <a:lumMod val="65000"/>
+        <a:lumOff val="35000"/>
+      </a:schemeClr>
+    </cs:fontRef>
+    <cs:spPr>
+      <a:noFill/>
+      <a:ln w="9525" cap="flat" cmpd="sng" algn="ctr">
+        <a:solidFill>
+          <a:schemeClr val="tx1">
+            <a:lumMod val="15000"/>
+            <a:lumOff val="85000"/>
+          </a:schemeClr>
+        </a:solidFill>
+        <a:round/>
+      </a:ln>
+    </cs:spPr>
+    <cs:defRPr sz="900" kern="1200"/>
+  </cs:dataTable>
+  <cs:downBar>
+    <cs:lnRef idx="0"/>
+    <cs:fillRef idx="0"/>
+    <cs:effectRef idx="0"/>
+    <cs:fontRef idx="minor">
+      <a:schemeClr val="tx1"/>
+    </cs:fontRef>
+    <cs:spPr>
+      <a:solidFill>
+        <a:schemeClr val="dk1">
+          <a:lumMod val="75000"/>
+          <a:lumOff val="25000"/>
+        </a:schemeClr>
+      </a:solidFill>
+      <a:ln w="9525" cap="flat" cmpd="sng" algn="ctr">
+        <a:solidFill>
+          <a:schemeClr val="tx1">
+            <a:lumMod val="65000"/>
+            <a:lumOff val="35000"/>
+          </a:schemeClr>
+        </a:solidFill>
+        <a:round/>
+      </a:ln>
+    </cs:spPr>
+  </cs:downBar>
+  <cs:dropLine>
+    <cs:lnRef idx="0"/>
+    <cs:fillRef idx="0"/>
+    <cs:effectRef idx="0"/>
+    <cs:fontRef idx="minor">
+      <a:schemeClr val="tx1"/>
+    </cs:fontRef>
+    <cs:spPr>
+      <a:ln w="9525" cap="flat" cmpd="sng" algn="ctr">
+        <a:solidFill>
+          <a:schemeClr val="tx1">
+            <a:lumMod val="35000"/>
+            <a:lumOff val="65000"/>
+          </a:schemeClr>
+        </a:solidFill>
+        <a:round/>
+      </a:ln>
+    </cs:spPr>
+  </cs:dropLine>
+  <cs:errorBar>
+    <cs:lnRef idx="0"/>
+    <cs:fillRef idx="0"/>
+    <cs:effectRef idx="0"/>
+    <cs:fontRef idx="minor">
+      <a:schemeClr val="tx1"/>
+    </cs:fontRef>
+    <cs:spPr>
+      <a:ln w="9525" cap="flat" cmpd="sng" algn="ctr">
+        <a:solidFill>
+          <a:schemeClr val="tx1">
+            <a:lumMod val="65000"/>
+            <a:lumOff val="35000"/>
+          </a:schemeClr>
+        </a:solidFill>
+        <a:round/>
+      </a:ln>
+    </cs:spPr>
+  </cs:errorBar>
+  <cs:floor>
+    <cs:lnRef idx="0"/>
+    <cs:fillRef idx="0"/>
+    <cs:effectRef idx="0"/>
+    <cs:fontRef idx="minor">
+      <a:schemeClr val="tx1"/>
+    </cs:fontRef>
+    <cs:spPr>
+      <a:noFill/>
+      <a:ln>
+        <a:noFill/>
+      </a:ln>
+    </cs:spPr>
+  </cs:floor>
+  <cs:gridlineMajor>
+    <cs:lnRef idx="0"/>
+    <cs:fillRef idx="0"/>
+    <cs:effectRef idx="0"/>
+    <cs:fontRef idx="minor">
+      <a:schemeClr val="tx1"/>
+    </cs:fontRef>
+    <cs:spPr>
+      <a:ln w="9525" cap="flat" cmpd="sng" algn="ctr">
+        <a:solidFill>
+          <a:schemeClr val="tx1">
+            <a:lumMod val="15000"/>
+            <a:lumOff val="85000"/>
+          </a:schemeClr>
+        </a:solidFill>
+        <a:round/>
+      </a:ln>
+    </cs:spPr>
+  </cs:gridlineMajor>
+  <cs:gridlineMinor>
+    <cs:lnRef idx="0"/>
+    <cs:fillRef idx="0"/>
+    <cs:effectRef idx="0"/>
+    <cs:fontRef idx="minor">
+      <a:schemeClr val="tx1"/>
+    </cs:fontRef>
+    <cs:spPr>
+      <a:ln w="9525" cap="flat" cmpd="sng" algn="ctr">
+        <a:solidFill>
+          <a:schemeClr val="tx1">
+            <a:lumMod val="5000"/>
+            <a:lumOff val="95000"/>
+          </a:schemeClr>
+        </a:solidFill>
+        <a:round/>
+      </a:ln>
+    </cs:spPr>
+  </cs:gridlineMinor>
+  <cs:hiLoLine>
+    <cs:lnRef idx="0"/>
+    <cs:fillRef idx="0"/>
+    <cs:effectRef idx="0"/>
+    <cs:fontRef idx="minor">
+      <a:schemeClr val="tx1"/>
+    </cs:fontRef>
+    <cs:spPr>
+      <a:ln w="9525" cap="flat" cmpd="sng" algn="ctr">
+        <a:solidFill>
+          <a:schemeClr val="tx1">
+            <a:lumMod val="50000"/>
+            <a:lumOff val="50000"/>
+          </a:schemeClr>
+        </a:solidFill>
+        <a:round/>
+      </a:ln>
+    </cs:spPr>
+  </cs:hiLoLine>
+  <cs:leaderLine>
+    <cs:lnRef idx="0"/>
+    <cs:fillRef idx="0"/>
+    <cs:effectRef idx="0"/>
+    <cs:fontRef idx="minor">
+      <a:schemeClr val="tx1"/>
+    </cs:fontRef>
+    <cs:spPr>
+      <a:ln w="9525" cap="flat" cmpd="sng" algn="ctr">
+        <a:solidFill>
+          <a:schemeClr val="tx1">
+            <a:lumMod val="35000"/>
+            <a:lumOff val="65000"/>
+          </a:schemeClr>
+        </a:solidFill>
+        <a:round/>
+      </a:ln>
+    </cs:spPr>
+  </cs:leaderLine>
+  <cs:legend>
+    <cs:lnRef idx="0"/>
+    <cs:fillRef idx="0"/>
+    <cs:effectRef idx="0"/>
+    <cs:fontRef idx="minor">
+      <a:schemeClr val="tx1">
+        <a:lumMod val="65000"/>
+        <a:lumOff val="35000"/>
+      </a:schemeClr>
+    </cs:fontRef>
+    <cs:defRPr sz="900" kern="1200"/>
+  </cs:legend>
+  <cs:plotArea mods="allowNoFillOverride allowNoLineOverride">
+    <cs:lnRef idx="0"/>
+    <cs:fillRef idx="0"/>
+    <cs:effectRef idx="0"/>
+    <cs:fontRef idx="minor">
+      <a:schemeClr val="tx1"/>
+    </cs:fontRef>
+  </cs:plotArea>
+  <cs:plotArea3D mods="allowNoFillOverride allowNoLineOverride">
+    <cs:lnRef idx="0"/>
+    <cs:fillRef idx="0"/>
+    <cs:effectRef idx="0"/>
+    <cs:fontRef idx="minor">
+      <a:schemeClr val="tx1"/>
+    </cs:fontRef>
+  </cs:plotArea3D>
+  <cs:seriesAxis>
+    <cs:lnRef idx="0"/>
+    <cs:fillRef idx="0"/>
+    <cs:effectRef idx="0"/>
+    <cs:fontRef idx="minor">
+      <a:schemeClr val="tx1">
+        <a:lumMod val="65000"/>
+        <a:lumOff val="35000"/>
+      </a:schemeClr>
+    </cs:fontRef>
+    <cs:defRPr sz="900" kern="1200"/>
+  </cs:seriesAxis>
+  <cs:seriesLine>
+    <cs:lnRef idx="0"/>
+    <cs:fillRef idx="0"/>
+    <cs:effectRef idx="0"/>
+    <cs:fontRef idx="minor">
+      <a:schemeClr val="tx1"/>
+    </cs:fontRef>
+    <cs:spPr>
+      <a:ln w="9525" cap="flat" cmpd="sng" algn="ctr">
+        <a:solidFill>
+          <a:schemeClr val="tx1">
+            <a:lumMod val="35000"/>
+            <a:lumOff val="65000"/>
+          </a:schemeClr>
+        </a:solidFill>
+        <a:round/>
+      </a:ln>
+    </cs:spPr>
+  </cs:seriesLine>
+  <cs:title>
+    <cs:lnRef idx="0"/>
+    <cs:fillRef idx="0"/>
+    <cs:effectRef idx="0"/>
+    <cs:fontRef idx="minor">
+      <a:schemeClr val="tx1">
+        <a:lumMod val="65000"/>
+        <a:lumOff val="35000"/>
+      </a:schemeClr>
+    </cs:fontRef>
+    <cs:defRPr sz="1400" b="0" kern="1200" spc="0" baseline="0"/>
+  </cs:title>
+  <cs:trendline>
+    <cs:lnRef idx="0">
+      <cs:styleClr val="auto"/>
+    </cs:lnRef>
+    <cs:fillRef idx="0"/>
+    <cs:effectRef idx="0"/>
+    <cs:fontRef idx="minor">
+      <a:schemeClr val="tx1"/>
+    </cs:fontRef>
+    <cs:spPr>
+      <a:ln w="19050" cap="rnd">
+        <a:solidFill>
+          <a:schemeClr val="phClr"/>
+        </a:solidFill>
+        <a:prstDash val="sysDot"/>
+      </a:ln>
+    </cs:spPr>
+  </cs:trendline>
+  <cs:trendlineLabel>
+    <cs:lnRef idx="0"/>
+    <cs:fillRef idx="0"/>
+    <cs:effectRef idx="0"/>
+    <cs:fontRef idx="minor">
+      <a:schemeClr val="tx1">
+        <a:lumMod val="65000"/>
+        <a:lumOff val="35000"/>
+      </a:schemeClr>
+    </cs:fontRef>
+    <cs:defRPr sz="900" kern="1200"/>
+  </cs:trendlineLabel>
+  <cs:upBar>
+    <cs:lnRef idx="0"/>
+    <cs:fillRef idx="0"/>
+    <cs:effectRef idx="0"/>
+    <cs:fontRef idx="minor">
+      <a:schemeClr val="tx1"/>
+    </cs:fontRef>
+    <cs:spPr>
+      <a:solidFill>
+        <a:schemeClr val="lt1"/>
+      </a:solidFill>
+      <a:ln w="9525" cap="flat" cmpd="sng" algn="ctr">
+        <a:solidFill>
+          <a:schemeClr val="tx1">
+            <a:lumMod val="65000"/>
+            <a:lumOff val="35000"/>
+          </a:schemeClr>
+        </a:solidFill>
+        <a:round/>
+      </a:ln>
+    </cs:spPr>
+  </cs:upBar>
+  <cs:valueAxis>
+    <cs:lnRef idx="0"/>
+    <cs:fillRef idx="0"/>
+    <cs:effectRef idx="0"/>
+    <cs:fontRef idx="minor">
+      <a:schemeClr val="tx1">
+        <a:lumMod val="65000"/>
+        <a:lumOff val="35000"/>
+      </a:schemeClr>
+    </cs:fontRef>
+    <cs:spPr>
+      <a:ln w="9525" cap="flat" cmpd="sng" algn="ctr">
+        <a:solidFill>
+          <a:schemeClr val="tx1">
+            <a:lumMod val="25000"/>
+            <a:lumOff val="75000"/>
+          </a:schemeClr>
+        </a:solidFill>
+        <a:round/>
+      </a:ln>
+    </cs:spPr>
+    <cs:defRPr sz="900" kern="1200"/>
+  </cs:valueAxis>
+  <cs:wall>
+    <cs:lnRef idx="0"/>
+    <cs:fillRef idx="0"/>
+    <cs:effectRef idx="0"/>
+    <cs:fontRef idx="minor">
+      <a:schemeClr val="tx1"/>
+    </cs:fontRef>
+    <cs:spPr>
+      <a:noFill/>
+      <a:ln>
+        <a:noFill/>
+      </a:ln>
+    </cs:spPr>
+  </cs:wall>
+</cs:chartStyle>
+</file>
+
 <file path=ppt/slideLayouts/slideLayout1.xml><?xml version="1.0" encoding="utf-8"?>
 <p:sldLayout xmlns:a="http://schemas.openxmlformats.org/drawingml/2006/main" xmlns:r="http://schemas.openxmlformats.org/officeDocument/2006/relationships" xmlns:p="http://schemas.openxmlformats.org/presentationml/2006/main" type="title" preserve="1">
   <p:cSld name="Title Slide">
@@ -2051,7 +3921,7 @@
           <a:p>
             <a:fld id="{03E8A227-5E4D-45A0-8DB7-88E07B092406}" type="datetimeFigureOut">
               <a:rPr lang="en-GB" smtClean="0"/>
-              <a:t>22/08/2018</a:t>
+              <a:t>04/11/2018</a:t>
             </a:fld>
             <a:endParaRPr lang="en-GB"/>
           </a:p>
@@ -2221,7 +4091,7 @@
           <a:p>
             <a:fld id="{03E8A227-5E4D-45A0-8DB7-88E07B092406}" type="datetimeFigureOut">
               <a:rPr lang="en-GB" smtClean="0"/>
-              <a:t>22/08/2018</a:t>
+              <a:t>04/11/2018</a:t>
             </a:fld>
             <a:endParaRPr lang="en-GB"/>
           </a:p>
@@ -2401,7 +4271,7 @@
           <a:p>
             <a:fld id="{03E8A227-5E4D-45A0-8DB7-88E07B092406}" type="datetimeFigureOut">
               <a:rPr lang="en-GB" smtClean="0"/>
-              <a:t>22/08/2018</a:t>
+              <a:t>04/11/2018</a:t>
             </a:fld>
             <a:endParaRPr lang="en-GB"/>
           </a:p>
@@ -2571,7 +4441,7 @@
           <a:p>
             <a:fld id="{03E8A227-5E4D-45A0-8DB7-88E07B092406}" type="datetimeFigureOut">
               <a:rPr lang="en-GB" smtClean="0"/>
-              <a:t>22/08/2018</a:t>
+              <a:t>04/11/2018</a:t>
             </a:fld>
             <a:endParaRPr lang="en-GB"/>
           </a:p>
@@ -2817,7 +4687,7 @@
           <a:p>
             <a:fld id="{03E8A227-5E4D-45A0-8DB7-88E07B092406}" type="datetimeFigureOut">
               <a:rPr lang="en-GB" smtClean="0"/>
-              <a:t>22/08/2018</a:t>
+              <a:t>04/11/2018</a:t>
             </a:fld>
             <a:endParaRPr lang="en-GB"/>
           </a:p>
@@ -3049,7 +4919,7 @@
           <a:p>
             <a:fld id="{03E8A227-5E4D-45A0-8DB7-88E07B092406}" type="datetimeFigureOut">
               <a:rPr lang="en-GB" smtClean="0"/>
-              <a:t>22/08/2018</a:t>
+              <a:t>04/11/2018</a:t>
             </a:fld>
             <a:endParaRPr lang="en-GB"/>
           </a:p>
@@ -3416,7 +5286,7 @@
           <a:p>
             <a:fld id="{03E8A227-5E4D-45A0-8DB7-88E07B092406}" type="datetimeFigureOut">
               <a:rPr lang="en-GB" smtClean="0"/>
-              <a:t>22/08/2018</a:t>
+              <a:t>04/11/2018</a:t>
             </a:fld>
             <a:endParaRPr lang="en-GB"/>
           </a:p>
@@ -3534,7 +5404,7 @@
           <a:p>
             <a:fld id="{03E8A227-5E4D-45A0-8DB7-88E07B092406}" type="datetimeFigureOut">
               <a:rPr lang="en-GB" smtClean="0"/>
-              <a:t>22/08/2018</a:t>
+              <a:t>04/11/2018</a:t>
             </a:fld>
             <a:endParaRPr lang="en-GB"/>
           </a:p>
@@ -3629,7 +5499,7 @@
           <a:p>
             <a:fld id="{03E8A227-5E4D-45A0-8DB7-88E07B092406}" type="datetimeFigureOut">
               <a:rPr lang="en-GB" smtClean="0"/>
-              <a:t>22/08/2018</a:t>
+              <a:t>04/11/2018</a:t>
             </a:fld>
             <a:endParaRPr lang="en-GB"/>
           </a:p>
@@ -3906,7 +5776,7 @@
           <a:p>
             <a:fld id="{03E8A227-5E4D-45A0-8DB7-88E07B092406}" type="datetimeFigureOut">
               <a:rPr lang="en-GB" smtClean="0"/>
-              <a:t>22/08/2018</a:t>
+              <a:t>04/11/2018</a:t>
             </a:fld>
             <a:endParaRPr lang="en-GB"/>
           </a:p>
@@ -4163,7 +6033,7 @@
           <a:p>
             <a:fld id="{03E8A227-5E4D-45A0-8DB7-88E07B092406}" type="datetimeFigureOut">
               <a:rPr lang="en-GB" smtClean="0"/>
-              <a:t>22/08/2018</a:t>
+              <a:t>04/11/2018</a:t>
             </a:fld>
             <a:endParaRPr lang="en-GB"/>
           </a:p>
@@ -4376,7 +6246,7 @@
           <a:p>
             <a:fld id="{03E8A227-5E4D-45A0-8DB7-88E07B092406}" type="datetimeFigureOut">
               <a:rPr lang="en-GB" smtClean="0"/>
-              <a:t>22/08/2018</a:t>
+              <a:t>04/11/2018</a:t>
             </a:fld>
             <a:endParaRPr lang="en-GB"/>
           </a:p>
@@ -4866,6 +6736,108 @@
 </p:sld>
 </file>
 
+<file path=ppt/slides/slide2.xml><?xml version="1.0" encoding="utf-8"?>
+<p:sld xmlns:a="http://schemas.openxmlformats.org/drawingml/2006/main" xmlns:r="http://schemas.openxmlformats.org/officeDocument/2006/relationships" xmlns:p="http://schemas.openxmlformats.org/presentationml/2006/main">
+  <p:cSld>
+    <p:spTree>
+      <p:nvGrpSpPr>
+        <p:cNvPr id="1" name=""/>
+        <p:cNvGrpSpPr/>
+        <p:nvPr/>
+      </p:nvGrpSpPr>
+      <p:grpSpPr>
+        <a:xfrm>
+          <a:off x="0" y="0"/>
+          <a:ext cx="0" cy="0"/>
+          <a:chOff x="0" y="0"/>
+          <a:chExt cx="0" cy="0"/>
+        </a:xfrm>
+      </p:grpSpPr>
+      <p:graphicFrame>
+        <p:nvGraphicFramePr>
+          <p:cNvPr id="4" name="Chart 3">
+            <a:extLst>
+              <a:ext uri="{FF2B5EF4-FFF2-40B4-BE49-F238E27FC236}">
+                <a16:creationId xmlns:a16="http://schemas.microsoft.com/office/drawing/2014/main" id="{00000000-0008-0000-0000-000003000000}"/>
+              </a:ext>
+            </a:extLst>
+          </p:cNvPr>
+          <p:cNvGraphicFramePr>
+            <a:graphicFrameLocks/>
+          </p:cNvGraphicFramePr>
+          <p:nvPr>
+            <p:extLst>
+              <p:ext uri="{D42A27DB-BD31-4B8C-83A1-F6EECF244321}">
+                <p14:modId xmlns:p14="http://schemas.microsoft.com/office/powerpoint/2010/main" val="4241157017"/>
+              </p:ext>
+            </p:extLst>
+          </p:nvPr>
+        </p:nvGraphicFramePr>
+        <p:xfrm>
+          <a:off x="0" y="0"/>
+          <a:ext cx="9601200" cy="5400675"/>
+        </p:xfrm>
+        <a:graphic>
+          <a:graphicData uri="http://schemas.openxmlformats.org/drawingml/2006/chart">
+            <c:chart xmlns:c="http://schemas.openxmlformats.org/drawingml/2006/chart" xmlns:r="http://schemas.openxmlformats.org/officeDocument/2006/relationships" r:id="rId2"/>
+          </a:graphicData>
+        </a:graphic>
+      </p:graphicFrame>
+      <p:sp>
+        <p:nvSpPr>
+          <p:cNvPr id="5" name="TextBox 4">
+            <a:extLst>
+              <a:ext uri="{FF2B5EF4-FFF2-40B4-BE49-F238E27FC236}">
+                <a16:creationId xmlns:a16="http://schemas.microsoft.com/office/drawing/2014/main" id="{A140A9D1-2E0A-42FF-B28A-F2AB4AC672A1}"/>
+              </a:ext>
+            </a:extLst>
+          </p:cNvPr>
+          <p:cNvSpPr txBox="1"/>
+          <p:nvPr/>
+        </p:nvSpPr>
+        <p:spPr>
+          <a:xfrm>
+            <a:off x="2466975" y="4992905"/>
+            <a:ext cx="1479636" cy="323165"/>
+          </a:xfrm>
+          <a:prstGeom prst="rect">
+            <a:avLst/>
+          </a:prstGeom>
+          <a:noFill/>
+        </p:spPr>
+        <p:txBody>
+          <a:bodyPr wrap="none" rtlCol="0">
+            <a:spAutoFit/>
+          </a:bodyPr>
+          <a:lstStyle/>
+          <a:p>
+            <a:r>
+              <a:rPr lang="en-GB" sz="1500" dirty="0">
+                <a:solidFill>
+                  <a:schemeClr val="tx1">
+                    <a:lumMod val="60000"/>
+                    <a:lumOff val="40000"/>
+                  </a:schemeClr>
+                </a:solidFill>
+              </a:rPr>
+              <a:t>Pattern rotation:</a:t>
+            </a:r>
+          </a:p>
+        </p:txBody>
+      </p:sp>
+    </p:spTree>
+    <p:extLst>
+      <p:ext uri="{BB962C8B-B14F-4D97-AF65-F5344CB8AC3E}">
+        <p14:creationId xmlns:p14="http://schemas.microsoft.com/office/powerpoint/2010/main" val="951579035"/>
+      </p:ext>
+    </p:extLst>
+  </p:cSld>
+  <p:clrMapOvr>
+    <a:masterClrMapping/>
+  </p:clrMapOvr>
+</p:sld>
+</file>
+
 <file path=ppt/theme/theme1.xml><?xml version="1.0" encoding="utf-8"?>
 <a:theme xmlns:a="http://schemas.openxmlformats.org/drawingml/2006/main" name="Office Theme">
   <a:themeElements>

</xml_diff>